<commit_message>
Add comments and remove unused scripts
</commit_message>
<xml_diff>
--- a/GesturePresentation.pptx
+++ b/GesturePresentation.pptx
@@ -14,6 +14,7 @@
     <p:sldId id="268" r:id="rId8"/>
     <p:sldId id="265" r:id="rId9"/>
     <p:sldId id="264" r:id="rId10"/>
+    <p:sldId id="270" r:id="rId11"/>
   </p:sldIdLst>
   <p:sldSz cx="12192000" cy="6858000"/>
   <p:notesSz cx="6858000" cy="9144000"/>
@@ -126,6 +127,7 @@
             <p14:sldId id="268"/>
             <p14:sldId id="265"/>
             <p14:sldId id="264"/>
+            <p14:sldId id="270"/>
           </p14:sldIdLst>
         </p14:section>
       </p14:sectionLst>
@@ -325,7 +327,7 @@
           <a:p>
             <a:fld id="{F849F088-AD06-4498-9BA6-D5DDC9DE9DD1}" type="datetimeFigureOut">
               <a:rPr lang="en-IE" smtClean="0"/>
-              <a:t>05/04/2019</a:t>
+              <a:t>09/04/2019</a:t>
             </a:fld>
             <a:endParaRPr lang="en-IE"/>
           </a:p>
@@ -663,7 +665,7 @@
           <a:p>
             <a:fld id="{F849F088-AD06-4498-9BA6-D5DDC9DE9DD1}" type="datetimeFigureOut">
               <a:rPr lang="en-IE" smtClean="0"/>
-              <a:t>05/04/2019</a:t>
+              <a:t>09/04/2019</a:t>
             </a:fld>
             <a:endParaRPr lang="en-IE"/>
           </a:p>
@@ -1064,7 +1066,7 @@
           <a:p>
             <a:fld id="{F849F088-AD06-4498-9BA6-D5DDC9DE9DD1}" type="datetimeFigureOut">
               <a:rPr lang="en-IE" smtClean="0"/>
-              <a:t>05/04/2019</a:t>
+              <a:t>09/04/2019</a:t>
             </a:fld>
             <a:endParaRPr lang="en-IE"/>
           </a:p>
@@ -1400,7 +1402,7 @@
           <a:p>
             <a:fld id="{F849F088-AD06-4498-9BA6-D5DDC9DE9DD1}" type="datetimeFigureOut">
               <a:rPr lang="en-IE" smtClean="0"/>
-              <a:t>05/04/2019</a:t>
+              <a:t>09/04/2019</a:t>
             </a:fld>
             <a:endParaRPr lang="en-IE"/>
           </a:p>
@@ -1720,7 +1722,7 @@
           <a:p>
             <a:fld id="{F849F088-AD06-4498-9BA6-D5DDC9DE9DD1}" type="datetimeFigureOut">
               <a:rPr lang="en-IE" smtClean="0"/>
-              <a:t>05/04/2019</a:t>
+              <a:t>09/04/2019</a:t>
             </a:fld>
             <a:endParaRPr lang="en-IE"/>
           </a:p>
@@ -2116,7 +2118,7 @@
           <a:p>
             <a:fld id="{F849F088-AD06-4498-9BA6-D5DDC9DE9DD1}" type="datetimeFigureOut">
               <a:rPr lang="en-IE" smtClean="0"/>
-              <a:t>05/04/2019</a:t>
+              <a:t>09/04/2019</a:t>
             </a:fld>
             <a:endParaRPr lang="en-IE"/>
           </a:p>
@@ -2373,7 +2375,7 @@
           <a:p>
             <a:fld id="{F849F088-AD06-4498-9BA6-D5DDC9DE9DD1}" type="datetimeFigureOut">
               <a:rPr lang="en-IE" smtClean="0"/>
-              <a:t>05/04/2019</a:t>
+              <a:t>09/04/2019</a:t>
             </a:fld>
             <a:endParaRPr lang="en-IE"/>
           </a:p>
@@ -2635,7 +2637,7 @@
           <a:p>
             <a:fld id="{F849F088-AD06-4498-9BA6-D5DDC9DE9DD1}" type="datetimeFigureOut">
               <a:rPr lang="en-IE" smtClean="0"/>
-              <a:t>05/04/2019</a:t>
+              <a:t>09/04/2019</a:t>
             </a:fld>
             <a:endParaRPr lang="en-IE"/>
           </a:p>
@@ -2897,7 +2899,7 @@
           <a:p>
             <a:fld id="{F849F088-AD06-4498-9BA6-D5DDC9DE9DD1}" type="datetimeFigureOut">
               <a:rPr lang="en-IE" smtClean="0"/>
-              <a:t>05/04/2019</a:t>
+              <a:t>09/04/2019</a:t>
             </a:fld>
             <a:endParaRPr lang="en-IE"/>
           </a:p>
@@ -3226,7 +3228,7 @@
           <a:p>
             <a:fld id="{F849F088-AD06-4498-9BA6-D5DDC9DE9DD1}" type="datetimeFigureOut">
               <a:rPr lang="en-IE" smtClean="0"/>
-              <a:t>05/04/2019</a:t>
+              <a:t>09/04/2019</a:t>
             </a:fld>
             <a:endParaRPr lang="en-IE"/>
           </a:p>
@@ -3549,7 +3551,7 @@
           <a:p>
             <a:fld id="{F849F088-AD06-4498-9BA6-D5DDC9DE9DD1}" type="datetimeFigureOut">
               <a:rPr lang="en-IE" smtClean="0"/>
-              <a:t>05/04/2019</a:t>
+              <a:t>09/04/2019</a:t>
             </a:fld>
             <a:endParaRPr lang="en-IE"/>
           </a:p>
@@ -4006,7 +4008,7 @@
           <a:p>
             <a:fld id="{F849F088-AD06-4498-9BA6-D5DDC9DE9DD1}" type="datetimeFigureOut">
               <a:rPr lang="en-IE" smtClean="0"/>
-              <a:t>05/04/2019</a:t>
+              <a:t>09/04/2019</a:t>
             </a:fld>
             <a:endParaRPr lang="en-IE"/>
           </a:p>
@@ -4211,7 +4213,7 @@
           <a:p>
             <a:fld id="{F849F088-AD06-4498-9BA6-D5DDC9DE9DD1}" type="datetimeFigureOut">
               <a:rPr lang="en-IE" smtClean="0"/>
-              <a:t>05/04/2019</a:t>
+              <a:t>09/04/2019</a:t>
             </a:fld>
             <a:endParaRPr lang="en-IE"/>
           </a:p>
@@ -4388,7 +4390,7 @@
           <a:p>
             <a:fld id="{F849F088-AD06-4498-9BA6-D5DDC9DE9DD1}" type="datetimeFigureOut">
               <a:rPr lang="en-IE" smtClean="0"/>
-              <a:t>05/04/2019</a:t>
+              <a:t>09/04/2019</a:t>
             </a:fld>
             <a:endParaRPr lang="en-IE"/>
           </a:p>
@@ -4721,7 +4723,7 @@
           <a:p>
             <a:fld id="{F849F088-AD06-4498-9BA6-D5DDC9DE9DD1}" type="datetimeFigureOut">
               <a:rPr lang="en-IE" smtClean="0"/>
-              <a:t>05/04/2019</a:t>
+              <a:t>09/04/2019</a:t>
             </a:fld>
             <a:endParaRPr lang="en-IE"/>
           </a:p>
@@ -5066,7 +5068,7 @@
           <a:p>
             <a:fld id="{F849F088-AD06-4498-9BA6-D5DDC9DE9DD1}" type="datetimeFigureOut">
               <a:rPr lang="en-IE" smtClean="0"/>
-              <a:t>05/04/2019</a:t>
+              <a:t>09/04/2019</a:t>
             </a:fld>
             <a:endParaRPr lang="en-IE"/>
           </a:p>
@@ -7183,7 +7185,7 @@
           <a:p>
             <a:fld id="{F849F088-AD06-4498-9BA6-D5DDC9DE9DD1}" type="datetimeFigureOut">
               <a:rPr lang="en-IE" smtClean="0"/>
-              <a:t>05/04/2019</a:t>
+              <a:t>09/04/2019</a:t>
             </a:fld>
             <a:endParaRPr lang="en-IE"/>
           </a:p>
@@ -10315,6 +10317,69 @@
 </p:sld>
 </file>
 
+<file path=ppt/slides/slide10.xml><?xml version="1.0" encoding="utf-8"?>
+<p:sld xmlns:a="http://schemas.openxmlformats.org/drawingml/2006/main" xmlns:r="http://schemas.openxmlformats.org/officeDocument/2006/relationships" xmlns:p="http://schemas.openxmlformats.org/presentationml/2006/main">
+  <p:cSld>
+    <p:spTree>
+      <p:nvGrpSpPr>
+        <p:cNvPr id="1" name=""/>
+        <p:cNvGrpSpPr/>
+        <p:nvPr/>
+      </p:nvGrpSpPr>
+      <p:grpSpPr>
+        <a:xfrm>
+          <a:off x="0" y="0"/>
+          <a:ext cx="0" cy="0"/>
+          <a:chOff x="0" y="0"/>
+          <a:chExt cx="0" cy="0"/>
+        </a:xfrm>
+      </p:grpSpPr>
+      <p:sp>
+        <p:nvSpPr>
+          <p:cNvPr id="2" name="Title 1">
+            <a:extLst>
+              <a:ext uri="{FF2B5EF4-FFF2-40B4-BE49-F238E27FC236}">
+                <a16:creationId xmlns:a16="http://schemas.microsoft.com/office/drawing/2014/main" id="{657D2635-1C05-498B-9BE7-CC53B88D2A67}"/>
+              </a:ext>
+            </a:extLst>
+          </p:cNvPr>
+          <p:cNvSpPr>
+            <a:spLocks noGrp="1"/>
+          </p:cNvSpPr>
+          <p:nvPr>
+            <p:ph type="title"/>
+          </p:nvPr>
+        </p:nvSpPr>
+        <p:spPr>
+          <a:xfrm>
+            <a:off x="5052040" y="2788555"/>
+            <a:ext cx="3186438" cy="1280890"/>
+          </a:xfrm>
+        </p:spPr>
+        <p:txBody>
+          <a:bodyPr/>
+          <a:lstStyle/>
+          <a:p>
+            <a:r>
+              <a:rPr lang="en-IE" dirty="0"/>
+              <a:t>Questions?</a:t>
+            </a:r>
+          </a:p>
+        </p:txBody>
+      </p:sp>
+    </p:spTree>
+    <p:extLst>
+      <p:ext uri="{BB962C8B-B14F-4D97-AF65-F5344CB8AC3E}">
+        <p14:creationId xmlns:p14="http://schemas.microsoft.com/office/powerpoint/2010/main" val="1556285984"/>
+      </p:ext>
+    </p:extLst>
+  </p:cSld>
+  <p:clrMapOvr>
+    <a:masterClrMapping/>
+  </p:clrMapOvr>
+</p:sld>
+</file>
+
 <file path=ppt/slides/slide2.xml><?xml version="1.0" encoding="utf-8"?>
 <p:sld xmlns:a="http://schemas.openxmlformats.org/drawingml/2006/main" xmlns:r="http://schemas.openxmlformats.org/officeDocument/2006/relationships" xmlns:p="http://schemas.openxmlformats.org/presentationml/2006/main">
   <p:cSld>
@@ -11557,7 +11622,7 @@
           <a:p>
             <a:r>
               <a:rPr lang="en-IE" dirty="0"/>
-              <a:t>Set up game environment </a:t>
+              <a:t>Set up game environment in unity</a:t>
             </a:r>
           </a:p>
           <a:p>

</xml_diff>